<commit_message>
some additional eda and embedding work
</commit_message>
<xml_diff>
--- a/powerpoint_slides/group_6_hackathon_update_1.pptx
+++ b/powerpoint_slides/group_6_hackathon_update_1.pptx
@@ -7,8 +7,10 @@
   <p:sldIdLst>
     <p:sldId id="256" r:id="rId2"/>
     <p:sldId id="257" r:id="rId3"/>
-    <p:sldId id="261" r:id="rId4"/>
-    <p:sldId id="260" r:id="rId5"/>
+    <p:sldId id="263" r:id="rId4"/>
+    <p:sldId id="262" r:id="rId5"/>
+    <p:sldId id="261" r:id="rId6"/>
+    <p:sldId id="260" r:id="rId7"/>
   </p:sldIdLst>
   <p:sldSz cx="12192000" cy="6858000"/>
   <p:notesSz cx="6858000" cy="9144000"/>
@@ -3804,7 +3806,7 @@
           <a:p>
             <a:r>
               <a:rPr lang="en-US" dirty="0"/>
-              <a:t>Progress summary</a:t>
+              <a:t>Progress summary – Data Handling</a:t>
             </a:r>
           </a:p>
         </p:txBody>
@@ -3827,15 +3829,25 @@
         </p:nvSpPr>
         <p:spPr/>
         <p:txBody>
-          <a:bodyPr/>
+          <a:bodyPr>
+            <a:normAutofit/>
+          </a:bodyPr>
           <a:lstStyle/>
           <a:p>
             <a:r>
+              <a:rPr lang="en-US" b="1" dirty="0"/>
+              <a:t>Extracted</a:t>
+            </a:r>
+            <a:r>
               <a:rPr lang="en-US" dirty="0"/>
-              <a:t>Extracted AB</a:t>
-            </a:r>
-            <a:r>
-              <a:rPr lang="en-US" baseline="-25000" dirty="0"/>
+              <a:t> </a:t>
+            </a:r>
+            <a:r>
+              <a:rPr lang="en-US" b="1" dirty="0"/>
+              <a:t>AB</a:t>
+            </a:r>
+            <a:r>
+              <a:rPr lang="en-US" b="1" baseline="-25000" dirty="0"/>
               <a:t>2</a:t>
             </a:r>
             <a:r>
@@ -3848,11 +3860,7 @@
             </a:r>
             <a:r>
               <a:rPr lang="en-US" dirty="0"/>
-              <a:t> files from the ICSD – </a:t>
-            </a:r>
-            <a:r>
-              <a:rPr lang="en-US" u="sng" dirty="0"/>
-              <a:t>17171 total</a:t>
+              <a:t> files from the ICSD – 17171 total</a:t>
             </a:r>
           </a:p>
           <a:p>
@@ -3864,8 +3872,36 @@
           </a:p>
           <a:p>
             <a:r>
+              <a:rPr lang="en-US" b="1" dirty="0"/>
+              <a:t>Filtered out</a:t>
+            </a:r>
+            <a:r>
               <a:rPr lang="en-US" dirty="0"/>
-              <a:t>Filtered out unwanted .</a:t>
+              <a:t> unwanted CIFs– 8758 remaining</a:t>
+            </a:r>
+          </a:p>
+          <a:p>
+            <a:pPr lvl="1"/>
+            <a:r>
+              <a:rPr lang="en-US" dirty="0"/>
+              <a:t>Some entries had 3 elements</a:t>
+            </a:r>
+          </a:p>
+          <a:p>
+            <a:pPr lvl="1"/>
+            <a:r>
+              <a:rPr lang="en-US" dirty="0"/>
+              <a:t>Some entries had partial occupancies</a:t>
+            </a:r>
+          </a:p>
+          <a:p>
+            <a:r>
+              <a:rPr lang="en-US" b="1" dirty="0"/>
+              <a:t>Extracted prototype information</a:t>
+            </a:r>
+            <a:r>
+              <a:rPr lang="en-US" dirty="0"/>
+              <a:t> from .</a:t>
             </a:r>
             <a:r>
               <a:rPr lang="en-US" dirty="0" err="1"/>
@@ -3873,31 +3909,31 @@
             </a:r>
             <a:r>
               <a:rPr lang="en-US" dirty="0"/>
-              <a:t> files – </a:t>
-            </a:r>
-            <a:r>
-              <a:rPr lang="en-US" u="sng" dirty="0"/>
-              <a:t>8758 remaining</a:t>
+              <a:t> files</a:t>
             </a:r>
           </a:p>
           <a:p>
             <a:pPr lvl="1"/>
             <a:r>
               <a:rPr lang="en-US" dirty="0"/>
-              <a:t>Some entries had 3 elements</a:t>
+              <a:t>Total of 418 unique prototypes</a:t>
             </a:r>
           </a:p>
           <a:p>
             <a:pPr lvl="1"/>
             <a:r>
               <a:rPr lang="en-US" dirty="0"/>
-              <a:t>Some entries had partial occupancies</a:t>
-            </a:r>
-          </a:p>
-          <a:p>
+              <a:t>converted to numerical labels for “one-vs-all” (binary) classification</a:t>
+            </a:r>
+          </a:p>
+          <a:p>
+            <a:r>
+              <a:rPr lang="en-US" b="1" dirty="0"/>
+              <a:t>Identified</a:t>
+            </a:r>
             <a:r>
               <a:rPr lang="en-US" dirty="0"/>
-              <a:t>Extract prototype information from .</a:t>
+              <a:t> the “A” and “B” elements for each .</a:t>
             </a:r>
             <a:r>
               <a:rPr lang="en-US" dirty="0" err="1"/>
@@ -3905,26 +3941,12 @@
             </a:r>
             <a:r>
               <a:rPr lang="en-US" dirty="0"/>
-              <a:t> files, converted to numerical labels</a:t>
-            </a:r>
-          </a:p>
-          <a:p>
-            <a:r>
-              <a:rPr lang="en-US" dirty="0"/>
-              <a:t>Identified the ”A” and “B” elements for each .</a:t>
-            </a:r>
-            <a:r>
-              <a:rPr lang="en-US" dirty="0" err="1"/>
-              <a:t>cif</a:t>
-            </a:r>
-            <a:r>
-              <a:rPr lang="en-US" dirty="0"/>
               <a:t> file</a:t>
             </a:r>
           </a:p>
           <a:p>
             <a:r>
-              <a:rPr lang="en-US" dirty="0" err="1"/>
+              <a:rPr lang="en-US" b="1" dirty="0" err="1"/>
               <a:t>Featurized</a:t>
             </a:r>
             <a:r>
@@ -3946,6 +3968,9 @@
               <a:rPr lang="en-US" dirty="0"/>
               <a:t>22 types of features * 2 elements = 44 total features</a:t>
             </a:r>
+          </a:p>
+          <a:p>
+            <a:endParaRPr lang="en-US" dirty="0"/>
           </a:p>
           <a:p>
             <a:endParaRPr lang="en-US" dirty="0"/>
@@ -3987,7 +4012,7 @@
           <p:cNvPr id="2" name="Title 1">
             <a:extLst>
               <a:ext uri="{FF2B5EF4-FFF2-40B4-BE49-F238E27FC236}">
-                <a16:creationId xmlns:a16="http://schemas.microsoft.com/office/drawing/2014/main" id="{D67EB3FD-9641-C591-1124-2E851A079EEB}"/>
+                <a16:creationId xmlns:a16="http://schemas.microsoft.com/office/drawing/2014/main" id="{0EFF9AD6-6D1B-4D86-CB77-8B847493C2CD}"/>
               </a:ext>
             </a:extLst>
           </p:cNvPr>
@@ -4005,60 +4030,17 @@
           <a:p>
             <a:r>
               <a:rPr lang="en-US" dirty="0"/>
-              <a:t>Challenges and next steps</a:t>
-            </a:r>
-          </a:p>
-        </p:txBody>
-      </p:sp>
-      <p:sp>
-        <p:nvSpPr>
-          <p:cNvPr id="3" name="Content Placeholder 2">
+              <a:t>Class Representation</a:t>
+            </a:r>
+          </a:p>
+        </p:txBody>
+      </p:sp>
+      <p:pic>
+        <p:nvPicPr>
+          <p:cNvPr id="4" name="Picture 3" descr="A screenshot of a computer program&#10;&#10;Description automatically generated with low confidence">
             <a:extLst>
               <a:ext uri="{FF2B5EF4-FFF2-40B4-BE49-F238E27FC236}">
-                <a16:creationId xmlns:a16="http://schemas.microsoft.com/office/drawing/2014/main" id="{7062F43A-2249-F9EC-635C-3FD51261370D}"/>
-              </a:ext>
-            </a:extLst>
-          </p:cNvPr>
-          <p:cNvSpPr>
-            <a:spLocks noGrp="1"/>
-          </p:cNvSpPr>
-          <p:nvPr>
-            <p:ph idx="1"/>
-          </p:nvPr>
-        </p:nvSpPr>
-        <p:spPr/>
-        <p:txBody>
-          <a:bodyPr/>
-          <a:lstStyle/>
-          <a:p>
-            <a:r>
-              <a:rPr lang="en-US" dirty="0"/>
-              <a:t>Initial symbolic expressions are non-physical</a:t>
-            </a:r>
-          </a:p>
-          <a:p>
-            <a:endParaRPr lang="en-US" dirty="0"/>
-          </a:p>
-          <a:p>
-            <a:endParaRPr lang="en-US" dirty="0"/>
-          </a:p>
-          <a:p>
-            <a:endParaRPr lang="en-US" dirty="0"/>
-          </a:p>
-          <a:p>
-            <a:endParaRPr lang="en-US" dirty="0"/>
-          </a:p>
-          <a:p>
-            <a:endParaRPr lang="en-US" dirty="0"/>
-          </a:p>
-        </p:txBody>
-      </p:sp>
-      <p:pic>
-        <p:nvPicPr>
-          <p:cNvPr id="7" name="Picture 6">
-            <a:extLst>
-              <a:ext uri="{FF2B5EF4-FFF2-40B4-BE49-F238E27FC236}">
-                <a16:creationId xmlns:a16="http://schemas.microsoft.com/office/drawing/2014/main" id="{2D9715C1-B8F8-D338-A05D-B632739B8B2B}"/>
+                <a16:creationId xmlns:a16="http://schemas.microsoft.com/office/drawing/2014/main" id="{24BC1CD3-6FC8-70EE-6737-4509E3DDFE9E}"/>
               </a:ext>
             </a:extLst>
           </p:cNvPr>
@@ -4075,8 +4057,8 @@
         </p:blipFill>
         <p:spPr>
           <a:xfrm>
-            <a:off x="640774" y="2152674"/>
-            <a:ext cx="10910451" cy="1142999"/>
+            <a:off x="3156438" y="1205349"/>
+            <a:ext cx="6356840" cy="5127406"/>
           </a:xfrm>
           <a:prstGeom prst="rect">
             <a:avLst/>
@@ -4086,7 +4068,7 @@
     </p:spTree>
     <p:extLst>
       <p:ext uri="{BB962C8B-B14F-4D97-AF65-F5344CB8AC3E}">
-        <p14:creationId xmlns:p14="http://schemas.microsoft.com/office/powerpoint/2010/main" val="3475562575"/>
+        <p14:creationId xmlns:p14="http://schemas.microsoft.com/office/powerpoint/2010/main" val="510967606"/>
       </p:ext>
     </p:extLst>
   </p:cSld>
@@ -4115,6 +4097,433 @@
       </p:grpSpPr>
       <p:sp>
         <p:nvSpPr>
+          <p:cNvPr id="3" name="Content Placeholder 2">
+            <a:extLst>
+              <a:ext uri="{FF2B5EF4-FFF2-40B4-BE49-F238E27FC236}">
+                <a16:creationId xmlns:a16="http://schemas.microsoft.com/office/drawing/2014/main" id="{5D77C8F3-6D5B-62C9-F461-3610C65D2248}"/>
+              </a:ext>
+            </a:extLst>
+          </p:cNvPr>
+          <p:cNvSpPr>
+            <a:spLocks noGrp="1"/>
+          </p:cNvSpPr>
+          <p:nvPr>
+            <p:ph idx="1"/>
+          </p:nvPr>
+        </p:nvSpPr>
+        <p:spPr/>
+        <p:txBody>
+          <a:bodyPr>
+            <a:normAutofit/>
+          </a:bodyPr>
+          <a:lstStyle/>
+          <a:p>
+            <a:r>
+              <a:rPr lang="en-US" b="1" dirty="0"/>
+              <a:t>Data Splitting:</a:t>
+            </a:r>
+            <a:r>
+              <a:rPr lang="en-US" dirty="0"/>
+              <a:t> Subsample negative class for equal class balance (50/50)</a:t>
+            </a:r>
+          </a:p>
+          <a:p>
+            <a:pPr lvl="1"/>
+            <a:r>
+              <a:rPr lang="en-US" dirty="0"/>
+              <a:t>Subsampling may affect model accuracy significantly (!)</a:t>
+            </a:r>
+          </a:p>
+          <a:p>
+            <a:pPr marL="419099" indent="-342900"/>
+            <a:r>
+              <a:rPr lang="en-US" b="1" dirty="0"/>
+              <a:t>Modeling: </a:t>
+            </a:r>
+            <a:r>
+              <a:rPr lang="en-US" dirty="0" err="1"/>
+              <a:t>Gplearn</a:t>
+            </a:r>
+            <a:r>
+              <a:rPr lang="en-US" dirty="0"/>
+              <a:t>, Symbolic Regression (SR) library with ”sci-kit learn” functionality</a:t>
+            </a:r>
+          </a:p>
+          <a:p>
+            <a:pPr lvl="1"/>
+            <a:r>
+              <a:rPr lang="en-US" dirty="0"/>
+              <a:t>Several hyperparameters to optimize evolutionary algorithm</a:t>
+            </a:r>
+          </a:p>
+          <a:p>
+            <a:pPr lvl="1"/>
+            <a:r>
+              <a:rPr lang="en-US" dirty="0"/>
+              <a:t>Initial symbolic expressions are non-physical</a:t>
+            </a:r>
+          </a:p>
+          <a:p>
+            <a:r>
+              <a:rPr lang="en-US" b="1" dirty="0"/>
+              <a:t>Model Benchmarking:</a:t>
+            </a:r>
+            <a:r>
+              <a:rPr lang="en-US" dirty="0"/>
+              <a:t> use Random Forest to benchmark SR model</a:t>
+            </a:r>
+          </a:p>
+          <a:p>
+            <a:pPr lvl="1"/>
+            <a:r>
+              <a:rPr lang="en-US" dirty="0"/>
+              <a:t>RF is one “classical” model to set an upper bound on potential SR performance</a:t>
+            </a:r>
+          </a:p>
+          <a:p>
+            <a:pPr lvl="1"/>
+            <a:r>
+              <a:rPr lang="en-US" dirty="0"/>
+              <a:t>Symbolic Regression is expected to underfit due to functional simplicity</a:t>
+            </a:r>
+          </a:p>
+          <a:p>
+            <a:pPr lvl="1"/>
+            <a:endParaRPr lang="en-US" dirty="0"/>
+          </a:p>
+        </p:txBody>
+      </p:sp>
+      <p:sp>
+        <p:nvSpPr>
+          <p:cNvPr id="4" name="Title 1">
+            <a:extLst>
+              <a:ext uri="{FF2B5EF4-FFF2-40B4-BE49-F238E27FC236}">
+                <a16:creationId xmlns:a16="http://schemas.microsoft.com/office/drawing/2014/main" id="{325E7B6E-837D-EA26-1C03-612DD8F47527}"/>
+              </a:ext>
+            </a:extLst>
+          </p:cNvPr>
+          <p:cNvSpPr>
+            <a:spLocks noGrp="1"/>
+          </p:cNvSpPr>
+          <p:nvPr>
+            <p:ph type="title"/>
+          </p:nvPr>
+        </p:nvSpPr>
+        <p:spPr>
+          <a:xfrm>
+            <a:off x="609600" y="274639"/>
+            <a:ext cx="10972800" cy="1143000"/>
+          </a:xfrm>
+        </p:spPr>
+        <p:txBody>
+          <a:bodyPr/>
+          <a:lstStyle/>
+          <a:p>
+            <a:r>
+              <a:rPr lang="en-US" dirty="0"/>
+              <a:t>Progress summary – Modelling</a:t>
+            </a:r>
+          </a:p>
+        </p:txBody>
+      </p:sp>
+    </p:spTree>
+    <p:extLst>
+      <p:ext uri="{BB962C8B-B14F-4D97-AF65-F5344CB8AC3E}">
+        <p14:creationId xmlns:p14="http://schemas.microsoft.com/office/powerpoint/2010/main" val="208590250"/>
+      </p:ext>
+    </p:extLst>
+  </p:cSld>
+  <p:clrMapOvr>
+    <a:masterClrMapping/>
+  </p:clrMapOvr>
+</p:sld>
+</file>
+
+<file path=ppt/slides/slide5.xml><?xml version="1.0" encoding="utf-8"?>
+<p:sld xmlns:a="http://schemas.openxmlformats.org/drawingml/2006/main" xmlns:r="http://schemas.openxmlformats.org/officeDocument/2006/relationships" xmlns:p="http://schemas.openxmlformats.org/presentationml/2006/main">
+  <p:cSld>
+    <p:spTree>
+      <p:nvGrpSpPr>
+        <p:cNvPr id="1" name=""/>
+        <p:cNvGrpSpPr/>
+        <p:nvPr/>
+      </p:nvGrpSpPr>
+      <p:grpSpPr>
+        <a:xfrm>
+          <a:off x="0" y="0"/>
+          <a:ext cx="0" cy="0"/>
+          <a:chOff x="0" y="0"/>
+          <a:chExt cx="0" cy="0"/>
+        </a:xfrm>
+      </p:grpSpPr>
+      <p:sp>
+        <p:nvSpPr>
+          <p:cNvPr id="2" name="Title 1">
+            <a:extLst>
+              <a:ext uri="{FF2B5EF4-FFF2-40B4-BE49-F238E27FC236}">
+                <a16:creationId xmlns:a16="http://schemas.microsoft.com/office/drawing/2014/main" id="{D67EB3FD-9641-C591-1124-2E851A079EEB}"/>
+              </a:ext>
+            </a:extLst>
+          </p:cNvPr>
+          <p:cNvSpPr>
+            <a:spLocks noGrp="1"/>
+          </p:cNvSpPr>
+          <p:nvPr>
+            <p:ph type="title"/>
+          </p:nvPr>
+        </p:nvSpPr>
+        <p:spPr/>
+        <p:txBody>
+          <a:bodyPr/>
+          <a:lstStyle/>
+          <a:p>
+            <a:r>
+              <a:rPr lang="en-US" dirty="0"/>
+              <a:t>Challenges and next steps</a:t>
+            </a:r>
+          </a:p>
+        </p:txBody>
+      </p:sp>
+      <p:sp>
+        <p:nvSpPr>
+          <p:cNvPr id="3" name="Content Placeholder 2">
+            <a:extLst>
+              <a:ext uri="{FF2B5EF4-FFF2-40B4-BE49-F238E27FC236}">
+                <a16:creationId xmlns:a16="http://schemas.microsoft.com/office/drawing/2014/main" id="{7062F43A-2249-F9EC-635C-3FD51261370D}"/>
+              </a:ext>
+            </a:extLst>
+          </p:cNvPr>
+          <p:cNvSpPr>
+            <a:spLocks noGrp="1"/>
+          </p:cNvSpPr>
+          <p:nvPr>
+            <p:ph idx="1"/>
+          </p:nvPr>
+        </p:nvSpPr>
+        <p:spPr>
+          <a:xfrm>
+            <a:off x="211015" y="1600201"/>
+            <a:ext cx="11371385" cy="4525963"/>
+          </a:xfrm>
+        </p:spPr>
+        <p:txBody>
+          <a:bodyPr>
+            <a:normAutofit lnSpcReduction="10000"/>
+          </a:bodyPr>
+          <a:lstStyle/>
+          <a:p>
+            <a:r>
+              <a:rPr lang="en-US" dirty="0"/>
+              <a:t>Initial symbolic expressions are non-physical (</a:t>
+            </a:r>
+            <a:r>
+              <a:rPr lang="en-US" dirty="0">
+                <a:solidFill>
+                  <a:srgbClr val="0070C0"/>
+                </a:solidFill>
+              </a:rPr>
+              <a:t>1</a:t>
+            </a:r>
+            <a:r>
+              <a:rPr lang="en-US" dirty="0"/>
+              <a:t> = Element </a:t>
+            </a:r>
+            <a:r>
+              <a:rPr lang="en-US" dirty="0">
+                <a:solidFill>
+                  <a:srgbClr val="0070C0"/>
+                </a:solidFill>
+              </a:rPr>
+              <a:t>A</a:t>
+            </a:r>
+            <a:r>
+              <a:rPr lang="en-US" dirty="0"/>
+              <a:t>, </a:t>
+            </a:r>
+            <a:r>
+              <a:rPr lang="en-US" dirty="0">
+                <a:solidFill>
+                  <a:srgbClr val="C00000"/>
+                </a:solidFill>
+              </a:rPr>
+              <a:t>2</a:t>
+            </a:r>
+            <a:r>
+              <a:rPr lang="en-US" dirty="0"/>
+              <a:t> = Element </a:t>
+            </a:r>
+            <a:r>
+              <a:rPr lang="en-US" dirty="0">
+                <a:solidFill>
+                  <a:srgbClr val="C00000"/>
+                </a:solidFill>
+              </a:rPr>
+              <a:t>B</a:t>
+            </a:r>
+            <a:r>
+              <a:rPr lang="en-US" dirty="0"/>
+              <a:t> for </a:t>
+            </a:r>
+            <a:r>
+              <a:rPr lang="en-US" dirty="0">
+                <a:solidFill>
+                  <a:srgbClr val="0070C0"/>
+                </a:solidFill>
+              </a:rPr>
+              <a:t>A</a:t>
+            </a:r>
+            <a:r>
+              <a:rPr lang="en-US" dirty="0">
+                <a:solidFill>
+                  <a:srgbClr val="C00000"/>
+                </a:solidFill>
+              </a:rPr>
+              <a:t>B</a:t>
+            </a:r>
+            <a:r>
+              <a:rPr lang="en-US" baseline="-25000" dirty="0">
+                <a:solidFill>
+                  <a:srgbClr val="C00000"/>
+                </a:solidFill>
+              </a:rPr>
+              <a:t>2</a:t>
+            </a:r>
+            <a:r>
+              <a:rPr lang="en-US" dirty="0"/>
+              <a:t>)</a:t>
+            </a:r>
+          </a:p>
+          <a:p>
+            <a:endParaRPr lang="en-US" dirty="0"/>
+          </a:p>
+          <a:p>
+            <a:endParaRPr lang="en-US" dirty="0"/>
+          </a:p>
+          <a:p>
+            <a:endParaRPr lang="en-US" dirty="0"/>
+          </a:p>
+          <a:p>
+            <a:r>
+              <a:rPr lang="en-US" dirty="0"/>
+              <a:t>Data still needs cleaning</a:t>
+            </a:r>
+            <a:endParaRPr lang="en-US" b="1" dirty="0"/>
+          </a:p>
+          <a:p>
+            <a:pPr lvl="1"/>
+            <a:r>
+              <a:rPr lang="en-US" b="1" dirty="0"/>
+              <a:t>Remove</a:t>
+            </a:r>
+            <a:r>
+              <a:rPr lang="en-US" dirty="0"/>
+              <a:t> infrequently represented classes(e.g. less than 10)</a:t>
+            </a:r>
+          </a:p>
+          <a:p>
+            <a:pPr lvl="1"/>
+            <a:r>
+              <a:rPr lang="en-US" b="1" dirty="0"/>
+              <a:t>Trim </a:t>
+            </a:r>
+            <a:r>
+              <a:rPr lang="en-US" dirty="0"/>
+              <a:t>features based on feature importance/cardinality</a:t>
+            </a:r>
+          </a:p>
+          <a:p>
+            <a:r>
+              <a:rPr lang="en-US" dirty="0"/>
+              <a:t>How to do k-fold validation with an inherently stochastic model?</a:t>
+            </a:r>
+          </a:p>
+          <a:p>
+            <a:pPr lvl="1"/>
+            <a:r>
+              <a:rPr lang="en-US" dirty="0"/>
+              <a:t>I.e. “Best” expression may vary from fold to fold</a:t>
+            </a:r>
+          </a:p>
+          <a:p>
+            <a:r>
+              <a:rPr lang="en-US" dirty="0"/>
+              <a:t>How to subsample negative data to avoid bias?</a:t>
+            </a:r>
+          </a:p>
+          <a:p>
+            <a:pPr lvl="1"/>
+            <a:r>
+              <a:rPr lang="en-US" dirty="0"/>
+              <a:t>Possibly pursue a “frequentist” approach and find SD on model performance over many different subsampled datasets</a:t>
+            </a:r>
+          </a:p>
+          <a:p>
+            <a:endParaRPr lang="en-US" dirty="0"/>
+          </a:p>
+        </p:txBody>
+      </p:sp>
+      <p:pic>
+        <p:nvPicPr>
+          <p:cNvPr id="7" name="Picture 6">
+            <a:extLst>
+              <a:ext uri="{FF2B5EF4-FFF2-40B4-BE49-F238E27FC236}">
+                <a16:creationId xmlns:a16="http://schemas.microsoft.com/office/drawing/2014/main" id="{2D9715C1-B8F8-D338-A05D-B632739B8B2B}"/>
+              </a:ext>
+            </a:extLst>
+          </p:cNvPr>
+          <p:cNvPicPr>
+            <a:picLocks noChangeAspect="1"/>
+          </p:cNvPicPr>
+          <p:nvPr/>
+        </p:nvPicPr>
+        <p:blipFill>
+          <a:blip r:embed="rId2"/>
+          <a:stretch>
+            <a:fillRect/>
+          </a:stretch>
+        </p:blipFill>
+        <p:spPr>
+          <a:xfrm>
+            <a:off x="211015" y="2074985"/>
+            <a:ext cx="10910461" cy="1143000"/>
+          </a:xfrm>
+          <a:prstGeom prst="rect">
+            <a:avLst/>
+          </a:prstGeom>
+        </p:spPr>
+      </p:pic>
+    </p:spTree>
+    <p:extLst>
+      <p:ext uri="{BB962C8B-B14F-4D97-AF65-F5344CB8AC3E}">
+        <p14:creationId xmlns:p14="http://schemas.microsoft.com/office/powerpoint/2010/main" val="3475562575"/>
+      </p:ext>
+    </p:extLst>
+  </p:cSld>
+  <p:clrMapOvr>
+    <a:masterClrMapping/>
+  </p:clrMapOvr>
+</p:sld>
+</file>
+
+<file path=ppt/slides/slide6.xml><?xml version="1.0" encoding="utf-8"?>
+<p:sld xmlns:a="http://schemas.openxmlformats.org/drawingml/2006/main" xmlns:r="http://schemas.openxmlformats.org/officeDocument/2006/relationships" xmlns:p="http://schemas.openxmlformats.org/presentationml/2006/main">
+  <p:cSld>
+    <p:spTree>
+      <p:nvGrpSpPr>
+        <p:cNvPr id="1" name=""/>
+        <p:cNvGrpSpPr/>
+        <p:nvPr/>
+      </p:nvGrpSpPr>
+      <p:grpSpPr>
+        <a:xfrm>
+          <a:off x="0" y="0"/>
+          <a:ext cx="0" cy="0"/>
+          <a:chOff x="0" y="0"/>
+          <a:chExt cx="0" cy="0"/>
+        </a:xfrm>
+      </p:grpSpPr>
+      <p:sp>
+        <p:nvSpPr>
           <p:cNvPr id="2" name="Title 1">
             <a:extLst>
               <a:ext uri="{FF2B5EF4-FFF2-40B4-BE49-F238E27FC236}">
@@ -4164,7 +4573,38 @@
           <a:p>
             <a:r>
               <a:rPr lang="en-US" dirty="0"/>
-              <a:t>If the RF model cannot achieve high accuracy, symbolic regression can never</a:t>
+              <a:t>If the RF model cannot achieve high accuracy, symbolic regression can never perform well (due to simplicity)</a:t>
+            </a:r>
+          </a:p>
+          <a:p>
+            <a:r>
+              <a:rPr lang="en-US" dirty="0"/>
+              <a:t>Negative example </a:t>
+            </a:r>
+            <a:r>
+              <a:rPr lang="en-US" b="1" dirty="0"/>
+              <a:t>subsampling</a:t>
+            </a:r>
+            <a:r>
+              <a:rPr lang="en-US" dirty="0"/>
+              <a:t> needs to be handled carefully when examining model robustness</a:t>
+            </a:r>
+          </a:p>
+          <a:p>
+            <a:r>
+              <a:rPr lang="en-US" dirty="0"/>
+              <a:t>Getting symbolic expressions that make </a:t>
+            </a:r>
+            <a:r>
+              <a:rPr lang="en-US" b="1" dirty="0"/>
+              <a:t>physical sense</a:t>
+            </a:r>
+          </a:p>
+          <a:p>
+            <a:pPr lvl="1"/>
+            <a:r>
+              <a:rPr lang="en-US" dirty="0"/>
+              <a:t>AI Feynman?? (another symbolic regression library)</a:t>
             </a:r>
           </a:p>
         </p:txBody>

</xml_diff>